<commit_message>
Angular 5.0.0-rc.2 Material 2.0.0-beta.12 Optimizations
</commit_message>
<xml_diff>
--- a/doc/ClassDiagram.pptx
+++ b/doc/ClassDiagram.pptx
@@ -288,7 +288,7 @@
           <a:p>
             <a:fld id="{EC0E1F67-17F0-4602-9D2F-5D3AE5D844D3}" type="datetimeFigureOut">
               <a:rPr lang="fr-FR" smtClean="0"/>
-              <a:t>21/11/2016</a:t>
+              <a:t>13/10/2017</a:t>
             </a:fld>
             <a:endParaRPr lang="fr-FR"/>
           </a:p>
@@ -453,7 +453,7 @@
           <a:p>
             <a:fld id="{EC0E1F67-17F0-4602-9D2F-5D3AE5D844D3}" type="datetimeFigureOut">
               <a:rPr lang="fr-FR" smtClean="0"/>
-              <a:t>21/11/2016</a:t>
+              <a:t>13/10/2017</a:t>
             </a:fld>
             <a:endParaRPr lang="fr-FR"/>
           </a:p>
@@ -628,7 +628,7 @@
           <a:p>
             <a:fld id="{EC0E1F67-17F0-4602-9D2F-5D3AE5D844D3}" type="datetimeFigureOut">
               <a:rPr lang="fr-FR" smtClean="0"/>
-              <a:t>21/11/2016</a:t>
+              <a:t>13/10/2017</a:t>
             </a:fld>
             <a:endParaRPr lang="fr-FR"/>
           </a:p>
@@ -793,7 +793,7 @@
           <a:p>
             <a:fld id="{EC0E1F67-17F0-4602-9D2F-5D3AE5D844D3}" type="datetimeFigureOut">
               <a:rPr lang="fr-FR" smtClean="0"/>
-              <a:t>21/11/2016</a:t>
+              <a:t>13/10/2017</a:t>
             </a:fld>
             <a:endParaRPr lang="fr-FR"/>
           </a:p>
@@ -1034,7 +1034,7 @@
           <a:p>
             <a:fld id="{EC0E1F67-17F0-4602-9D2F-5D3AE5D844D3}" type="datetimeFigureOut">
               <a:rPr lang="fr-FR" smtClean="0"/>
-              <a:t>21/11/2016</a:t>
+              <a:t>13/10/2017</a:t>
             </a:fld>
             <a:endParaRPr lang="fr-FR"/>
           </a:p>
@@ -1317,7 +1317,7 @@
           <a:p>
             <a:fld id="{EC0E1F67-17F0-4602-9D2F-5D3AE5D844D3}" type="datetimeFigureOut">
               <a:rPr lang="fr-FR" smtClean="0"/>
-              <a:t>21/11/2016</a:t>
+              <a:t>13/10/2017</a:t>
             </a:fld>
             <a:endParaRPr lang="fr-FR"/>
           </a:p>
@@ -1734,7 +1734,7 @@
           <a:p>
             <a:fld id="{EC0E1F67-17F0-4602-9D2F-5D3AE5D844D3}" type="datetimeFigureOut">
               <a:rPr lang="fr-FR" smtClean="0"/>
-              <a:t>21/11/2016</a:t>
+              <a:t>13/10/2017</a:t>
             </a:fld>
             <a:endParaRPr lang="fr-FR"/>
           </a:p>
@@ -1847,7 +1847,7 @@
           <a:p>
             <a:fld id="{EC0E1F67-17F0-4602-9D2F-5D3AE5D844D3}" type="datetimeFigureOut">
               <a:rPr lang="fr-FR" smtClean="0"/>
-              <a:t>21/11/2016</a:t>
+              <a:t>13/10/2017</a:t>
             </a:fld>
             <a:endParaRPr lang="fr-FR"/>
           </a:p>
@@ -1937,7 +1937,7 @@
           <a:p>
             <a:fld id="{EC0E1F67-17F0-4602-9D2F-5D3AE5D844D3}" type="datetimeFigureOut">
               <a:rPr lang="fr-FR" smtClean="0"/>
-              <a:t>21/11/2016</a:t>
+              <a:t>13/10/2017</a:t>
             </a:fld>
             <a:endParaRPr lang="fr-FR"/>
           </a:p>
@@ -2209,7 +2209,7 @@
           <a:p>
             <a:fld id="{EC0E1F67-17F0-4602-9D2F-5D3AE5D844D3}" type="datetimeFigureOut">
               <a:rPr lang="fr-FR" smtClean="0"/>
-              <a:t>21/11/2016</a:t>
+              <a:t>13/10/2017</a:t>
             </a:fld>
             <a:endParaRPr lang="fr-FR"/>
           </a:p>
@@ -2457,7 +2457,7 @@
           <a:p>
             <a:fld id="{EC0E1F67-17F0-4602-9D2F-5D3AE5D844D3}" type="datetimeFigureOut">
               <a:rPr lang="fr-FR" smtClean="0"/>
-              <a:t>21/11/2016</a:t>
+              <a:t>13/10/2017</a:t>
             </a:fld>
             <a:endParaRPr lang="fr-FR"/>
           </a:p>
@@ -2665,7 +2665,7 @@
           <a:p>
             <a:fld id="{EC0E1F67-17F0-4602-9D2F-5D3AE5D844D3}" type="datetimeFigureOut">
               <a:rPr lang="fr-FR" smtClean="0"/>
-              <a:t>21/11/2016</a:t>
+              <a:t>13/10/2017</a:t>
             </a:fld>
             <a:endParaRPr lang="fr-FR"/>
           </a:p>
@@ -3218,7 +3218,7 @@
         </p:nvSpPr>
         <p:spPr>
           <a:xfrm>
-            <a:off x="2627784" y="1916832"/>
+            <a:off x="2903258" y="3513764"/>
             <a:ext cx="1872208" cy="540000"/>
           </a:xfrm>
           <a:prstGeom prst="roundRect">
@@ -3258,15 +3258,15 @@
         <p:nvCxnSpPr>
           <p:cNvPr id="10" name="Connecteur droit avec flèche 9"/>
           <p:cNvCxnSpPr>
-            <a:stCxn id="8" idx="0"/>
+            <a:stCxn id="67" idx="0"/>
             <a:endCxn id="4" idx="2"/>
           </p:cNvCxnSpPr>
           <p:nvPr/>
         </p:nvCxnSpPr>
         <p:spPr>
           <a:xfrm flipV="1">
-            <a:off x="3563888" y="728640"/>
-            <a:ext cx="1025984" cy="1188192"/>
+            <a:off x="3785788" y="728640"/>
+            <a:ext cx="804084" cy="1458192"/>
           </a:xfrm>
           <a:prstGeom prst="straightConnector1">
             <a:avLst/>
@@ -3646,7 +3646,7 @@
         </p:nvSpPr>
         <p:spPr>
           <a:xfrm>
-            <a:off x="2411760" y="3068960"/>
+            <a:off x="2597656" y="2186832"/>
             <a:ext cx="2376264" cy="540000"/>
           </a:xfrm>
           <a:prstGeom prst="roundRect">
@@ -3682,42 +3682,6 @@
           </a:p>
         </p:txBody>
       </p:sp>
-      <p:cxnSp>
-        <p:nvCxnSpPr>
-          <p:cNvPr id="69" name="Connecteur droit avec flèche 68"/>
-          <p:cNvCxnSpPr>
-            <a:stCxn id="67" idx="0"/>
-            <a:endCxn id="8" idx="2"/>
-          </p:cNvCxnSpPr>
-          <p:nvPr/>
-        </p:nvCxnSpPr>
-        <p:spPr>
-          <a:xfrm flipH="1" flipV="1">
-            <a:off x="3563888" y="2456832"/>
-            <a:ext cx="36004" cy="612128"/>
-          </a:xfrm>
-          <a:prstGeom prst="straightConnector1">
-            <a:avLst/>
-          </a:prstGeom>
-          <a:ln>
-            <a:tailEnd type="arrow"/>
-          </a:ln>
-        </p:spPr>
-        <p:style>
-          <a:lnRef idx="1">
-            <a:schemeClr val="accent1"/>
-          </a:lnRef>
-          <a:fillRef idx="0">
-            <a:schemeClr val="accent1"/>
-          </a:fillRef>
-          <a:effectRef idx="0">
-            <a:schemeClr val="accent1"/>
-          </a:effectRef>
-          <a:fontRef idx="minor">
-            <a:schemeClr val="tx1"/>
-          </a:fontRef>
-        </p:style>
-      </p:cxnSp>
       <p:sp>
         <p:nvSpPr>
           <p:cNvPr id="84" name="Rectangle à coins arrondis 83"/>
@@ -3806,7 +3770,7 @@
         </p:nvSpPr>
         <p:spPr>
           <a:xfrm>
-            <a:off x="4932040" y="4077072"/>
+            <a:off x="5076056" y="4293096"/>
             <a:ext cx="1800200" cy="540000"/>
           </a:xfrm>
           <a:prstGeom prst="roundRect">
@@ -3854,7 +3818,43 @@
         <p:spPr>
           <a:xfrm flipH="1" flipV="1">
             <a:off x="4589872" y="728640"/>
-            <a:ext cx="1242268" cy="3348432"/>
+            <a:ext cx="1386284" cy="3564456"/>
+          </a:xfrm>
+          <a:prstGeom prst="straightConnector1">
+            <a:avLst/>
+          </a:prstGeom>
+          <a:ln>
+            <a:tailEnd type="arrow"/>
+          </a:ln>
+        </p:spPr>
+        <p:style>
+          <a:lnRef idx="1">
+            <a:schemeClr val="accent1"/>
+          </a:lnRef>
+          <a:fillRef idx="0">
+            <a:schemeClr val="accent1"/>
+          </a:fillRef>
+          <a:effectRef idx="0">
+            <a:schemeClr val="accent1"/>
+          </a:effectRef>
+          <a:fontRef idx="minor">
+            <a:schemeClr val="tx1"/>
+          </a:fontRef>
+        </p:style>
+      </p:cxnSp>
+      <p:cxnSp>
+        <p:nvCxnSpPr>
+          <p:cNvPr id="27" name="Connecteur droit avec flèche 26"/>
+          <p:cNvCxnSpPr>
+            <a:stCxn id="8" idx="0"/>
+            <a:endCxn id="67" idx="2"/>
+          </p:cNvCxnSpPr>
+          <p:nvPr/>
+        </p:nvCxnSpPr>
+        <p:spPr>
+          <a:xfrm flipH="1" flipV="1">
+            <a:off x="3785788" y="2726832"/>
+            <a:ext cx="53574" cy="786932"/>
           </a:xfrm>
           <a:prstGeom prst="straightConnector1">
             <a:avLst/>

</xml_diff>